<commit_message>
Final review & edits
</commit_message>
<xml_diff>
--- a/IntroPython_TipsForSuccess.pptx
+++ b/IntroPython_TipsForSuccess.pptx
@@ -241,7 +241,7 @@
           <a:p>
             <a:fld id="{A5E0BFC4-8313-4166-9F8C-AEF6252D3F15}" type="datetimeFigureOut">
               <a:rPr lang="en-US" smtClean="0"/>
-              <a:t>2/12/2020</a:t>
+              <a:t>2/18/2020</a:t>
             </a:fld>
             <a:endParaRPr lang="en-US"/>
           </a:p>
@@ -875,7 +875,7 @@
           <a:p>
             <a:fld id="{697E48F7-EB74-4477-B245-F8CECF7C0C00}" type="datetimeFigureOut">
               <a:rPr lang="en-US" smtClean="0"/>
-              <a:t>2/12/2020</a:t>
+              <a:t>2/18/2020</a:t>
             </a:fld>
             <a:endParaRPr lang="en-US"/>
           </a:p>
@@ -1122,7 +1122,7 @@
           <a:p>
             <a:fld id="{697E48F7-EB74-4477-B245-F8CECF7C0C00}" type="datetimeFigureOut">
               <a:rPr lang="en-US" smtClean="0"/>
-              <a:t>2/12/2020</a:t>
+              <a:t>2/18/2020</a:t>
             </a:fld>
             <a:endParaRPr lang="en-US"/>
           </a:p>
@@ -1508,7 +1508,7 @@
           <a:p>
             <a:fld id="{697E48F7-EB74-4477-B245-F8CECF7C0C00}" type="datetimeFigureOut">
               <a:rPr lang="en-US" smtClean="0"/>
-              <a:t>2/12/2020</a:t>
+              <a:t>2/18/2020</a:t>
             </a:fld>
             <a:endParaRPr lang="en-US"/>
           </a:p>
@@ -1737,7 +1737,7 @@
           <a:p>
             <a:fld id="{697E48F7-EB74-4477-B245-F8CECF7C0C00}" type="datetimeFigureOut">
               <a:rPr lang="en-US" smtClean="0"/>
-              <a:t>2/12/2020</a:t>
+              <a:t>2/18/2020</a:t>
             </a:fld>
             <a:endParaRPr lang="en-US"/>
           </a:p>
@@ -2228,7 +2228,7 @@
           <a:p>
             <a:fld id="{697E48F7-EB74-4477-B245-F8CECF7C0C00}" type="datetimeFigureOut">
               <a:rPr lang="en-US" smtClean="0"/>
-              <a:t>2/12/2020</a:t>
+              <a:t>2/18/2020</a:t>
             </a:fld>
             <a:endParaRPr lang="en-US"/>
           </a:p>
@@ -2538,7 +2538,7 @@
           <a:p>
             <a:fld id="{697E48F7-EB74-4477-B245-F8CECF7C0C00}" type="datetimeFigureOut">
               <a:rPr lang="en-US" smtClean="0"/>
-              <a:t>2/12/2020</a:t>
+              <a:t>2/18/2020</a:t>
             </a:fld>
             <a:endParaRPr lang="en-US"/>
           </a:p>
@@ -2929,7 +2929,7 @@
           <a:p>
             <a:fld id="{697E48F7-EB74-4477-B245-F8CECF7C0C00}" type="datetimeFigureOut">
               <a:rPr lang="en-US" smtClean="0"/>
-              <a:t>2/12/2020</a:t>
+              <a:t>2/18/2020</a:t>
             </a:fld>
             <a:endParaRPr lang="en-US"/>
           </a:p>
@@ -3047,7 +3047,7 @@
           <a:p>
             <a:fld id="{697E48F7-EB74-4477-B245-F8CECF7C0C00}" type="datetimeFigureOut">
               <a:rPr lang="en-US" smtClean="0"/>
-              <a:t>2/12/2020</a:t>
+              <a:t>2/18/2020</a:t>
             </a:fld>
             <a:endParaRPr lang="en-US"/>
           </a:p>
@@ -3142,7 +3142,7 @@
           <a:p>
             <a:fld id="{697E48F7-EB74-4477-B245-F8CECF7C0C00}" type="datetimeFigureOut">
               <a:rPr lang="en-US" smtClean="0"/>
-              <a:t>2/12/2020</a:t>
+              <a:t>2/18/2020</a:t>
             </a:fld>
             <a:endParaRPr lang="en-US"/>
           </a:p>
@@ -3442,7 +3442,7 @@
           <a:p>
             <a:fld id="{697E48F7-EB74-4477-B245-F8CECF7C0C00}" type="datetimeFigureOut">
               <a:rPr lang="en-US" smtClean="0"/>
-              <a:t>2/12/2020</a:t>
+              <a:t>2/18/2020</a:t>
             </a:fld>
             <a:endParaRPr lang="en-US"/>
           </a:p>
@@ -3707,7 +3707,7 @@
           <a:p>
             <a:fld id="{697E48F7-EB74-4477-B245-F8CECF7C0C00}" type="datetimeFigureOut">
               <a:rPr lang="en-US" smtClean="0"/>
-              <a:t>2/12/2020</a:t>
+              <a:t>2/18/2020</a:t>
             </a:fld>
             <a:endParaRPr lang="en-US"/>
           </a:p>
@@ -4125,7 +4125,7 @@
           <a:p>
             <a:fld id="{697E48F7-EB74-4477-B245-F8CECF7C0C00}" type="datetimeFigureOut">
               <a:rPr lang="en-US" smtClean="0"/>
-              <a:t>2/12/2020</a:t>
+              <a:t>2/18/2020</a:t>
             </a:fld>
             <a:endParaRPr lang="en-US"/>
           </a:p>
@@ -6038,7 +6038,7 @@
           <a:p>
             <a:r>
               <a:rPr lang="en-US" dirty="0"/>
-              <a:t>Are you missing important information ?</a:t>
+              <a:t>Are you missing important information?</a:t>
             </a:r>
           </a:p>
           <a:p>
@@ -17487,7 +17487,7 @@
           <a:p>
             <a:r>
               <a:rPr lang="en-US" dirty="0"/>
-              <a:t>Tip #3 - String Cleaning &amp; Variable Creation</a:t>
+              <a:t>Tip #3 - String cleaning &amp; variable creation</a:t>
             </a:r>
           </a:p>
           <a:p>

</xml_diff>